<commit_message>
feat(main): make course structure
</commit_message>
<xml_diff>
--- a/group-project/stage01/presentation/presentation.pptx
+++ b/group-project/stage01/presentation/presentation.pptx
@@ -1794,7 +1794,7 @@
         <p:spPr>
           <a:xfrm>
             <a:off x="346963" y="1923668"/>
-            <a:ext cx="1608455" cy="166071"/>
+            <a:ext cx="4015487" cy="450316"/>
           </a:xfrm>
           <a:prstGeom prst="rect">
             <a:avLst/>
@@ -1808,7 +1808,7 @@
           <a:p>
             <a:pPr marL="12700">
               <a:lnSpc>
-                <a:spcPct val="100000"/>
+                <a:spcPct val="150000"/>
               </a:lnSpc>
               <a:spcBef>
                 <a:spcPts val="95"/>
@@ -1833,6 +1833,16 @@
                 <a:cs typeface="Palatino Linotype"/>
               </a:rPr>
               <a:t> </a:t>
+            </a:r>
+            <a:r>
+              <a:rPr lang="ru-RU" sz="1000" spc="-10" dirty="0">
+                <a:solidFill>
+                  <a:srgbClr val="213739"/>
+                </a:solidFill>
+                <a:latin typeface="Palatino Linotype"/>
+                <a:cs typeface="Palatino Linotype"/>
+              </a:rPr>
+              <a:t>Кеан Путхеаро Мухтарова К.А. Оразгелдиева Орулнур </a:t>
             </a:r>
             <a:r>
               <a:rPr sz="1000" spc="-5" dirty="0">

</xml_diff>